<commit_message>
individueel logboek 3 toegevoegd
</commit_message>
<xml_diff>
--- a/Documentatie/Individuele logboeken/individueel_logboek_2_joris.pptx
+++ b/Documentatie/Individuele logboeken/individueel_logboek_2_joris.pptx
@@ -262,7 +262,7 @@
           <a:p>
             <a:fld id="{D7AA17B8-340D-4F54-8707-249F7E661113}" type="datetimeFigureOut">
               <a:rPr lang="nl-NL" smtClean="0"/>
-              <a:t>22-1-2021</a:t>
+              <a:t>29-1-2021</a:t>
             </a:fld>
             <a:endParaRPr lang="nl-NL"/>
           </a:p>
@@ -460,7 +460,7 @@
           <a:p>
             <a:fld id="{D7AA17B8-340D-4F54-8707-249F7E661113}" type="datetimeFigureOut">
               <a:rPr lang="nl-NL" smtClean="0"/>
-              <a:t>22-1-2021</a:t>
+              <a:t>29-1-2021</a:t>
             </a:fld>
             <a:endParaRPr lang="nl-NL"/>
           </a:p>
@@ -668,7 +668,7 @@
           <a:p>
             <a:fld id="{D7AA17B8-340D-4F54-8707-249F7E661113}" type="datetimeFigureOut">
               <a:rPr lang="nl-NL" smtClean="0"/>
-              <a:t>22-1-2021</a:t>
+              <a:t>29-1-2021</a:t>
             </a:fld>
             <a:endParaRPr lang="nl-NL"/>
           </a:p>
@@ -866,7 +866,7 @@
           <a:p>
             <a:fld id="{D7AA17B8-340D-4F54-8707-249F7E661113}" type="datetimeFigureOut">
               <a:rPr lang="nl-NL" smtClean="0"/>
-              <a:t>22-1-2021</a:t>
+              <a:t>29-1-2021</a:t>
             </a:fld>
             <a:endParaRPr lang="nl-NL"/>
           </a:p>
@@ -1141,7 +1141,7 @@
           <a:p>
             <a:fld id="{D7AA17B8-340D-4F54-8707-249F7E661113}" type="datetimeFigureOut">
               <a:rPr lang="nl-NL" smtClean="0"/>
-              <a:t>22-1-2021</a:t>
+              <a:t>29-1-2021</a:t>
             </a:fld>
             <a:endParaRPr lang="nl-NL"/>
           </a:p>
@@ -1406,7 +1406,7 @@
           <a:p>
             <a:fld id="{D7AA17B8-340D-4F54-8707-249F7E661113}" type="datetimeFigureOut">
               <a:rPr lang="nl-NL" smtClean="0"/>
-              <a:t>22-1-2021</a:t>
+              <a:t>29-1-2021</a:t>
             </a:fld>
             <a:endParaRPr lang="nl-NL"/>
           </a:p>
@@ -1818,7 +1818,7 @@
           <a:p>
             <a:fld id="{D7AA17B8-340D-4F54-8707-249F7E661113}" type="datetimeFigureOut">
               <a:rPr lang="nl-NL" smtClean="0"/>
-              <a:t>22-1-2021</a:t>
+              <a:t>29-1-2021</a:t>
             </a:fld>
             <a:endParaRPr lang="nl-NL"/>
           </a:p>
@@ -1959,7 +1959,7 @@
           <a:p>
             <a:fld id="{D7AA17B8-340D-4F54-8707-249F7E661113}" type="datetimeFigureOut">
               <a:rPr lang="nl-NL" smtClean="0"/>
-              <a:t>22-1-2021</a:t>
+              <a:t>29-1-2021</a:t>
             </a:fld>
             <a:endParaRPr lang="nl-NL"/>
           </a:p>
@@ -2072,7 +2072,7 @@
           <a:p>
             <a:fld id="{D7AA17B8-340D-4F54-8707-249F7E661113}" type="datetimeFigureOut">
               <a:rPr lang="nl-NL" smtClean="0"/>
-              <a:t>22-1-2021</a:t>
+              <a:t>29-1-2021</a:t>
             </a:fld>
             <a:endParaRPr lang="nl-NL"/>
           </a:p>
@@ -2383,7 +2383,7 @@
           <a:p>
             <a:fld id="{D7AA17B8-340D-4F54-8707-249F7E661113}" type="datetimeFigureOut">
               <a:rPr lang="nl-NL" smtClean="0"/>
-              <a:t>22-1-2021</a:t>
+              <a:t>29-1-2021</a:t>
             </a:fld>
             <a:endParaRPr lang="nl-NL"/>
           </a:p>
@@ -2671,7 +2671,7 @@
           <a:p>
             <a:fld id="{D7AA17B8-340D-4F54-8707-249F7E661113}" type="datetimeFigureOut">
               <a:rPr lang="nl-NL" smtClean="0"/>
-              <a:t>22-1-2021</a:t>
+              <a:t>29-1-2021</a:t>
             </a:fld>
             <a:endParaRPr lang="nl-NL"/>
           </a:p>
@@ -2912,7 +2912,7 @@
           <a:p>
             <a:fld id="{D7AA17B8-340D-4F54-8707-249F7E661113}" type="datetimeFigureOut">
               <a:rPr lang="nl-NL" smtClean="0"/>
-              <a:t>22-1-2021</a:t>
+              <a:t>29-1-2021</a:t>
             </a:fld>
             <a:endParaRPr lang="nl-NL"/>
           </a:p>
@@ -3348,7 +3348,7 @@
         <p:spPr/>
         <p:txBody>
           <a:bodyPr>
-            <a:normAutofit fontScale="90000"/>
+            <a:normAutofit/>
           </a:bodyPr>
           <a:lstStyle/>
           <a:p>
@@ -3362,7 +3362,15 @@
             </a:r>
             <a:r>
               <a:rPr lang="nl-NL" dirty="0"/>
-              <a:t> logboek eerste sprint </a:t>
+              <a:t> </a:t>
+            </a:r>
+            <a:r>
+              <a:rPr lang="nl-NL"/>
+              <a:t>logboek 2e </a:t>
+            </a:r>
+            <a:r>
+              <a:rPr lang="nl-NL" dirty="0"/>
+              <a:t>sprint </a:t>
             </a:r>
             <a:br>
               <a:rPr lang="nl-NL" dirty="0"/>

</xml_diff>